<commit_message>
Ben - Final Push
Updated the Final folder
</commit_message>
<xml_diff>
--- a/Dev/Ben/Presentation/Ben_Machine_Learning_Slides.pptx
+++ b/Dev/Ben/Presentation/Ben_Machine_Learning_Slides.pptx
@@ -122,6 +122,7 @@
 <p1510:revInfo xmlns:a="http://schemas.openxmlformats.org/drawingml/2006/main" xmlns:r="http://schemas.openxmlformats.org/officeDocument/2006/relationships" xmlns:p1510="http://schemas.microsoft.com/office/powerpoint/2015/10/main">
   <p1510:revLst>
     <p1510:client id="{3A7A832D-5E3D-444C-A01F-54A9E6992541}" v="122" dt="2020-07-24T02:23:49.674"/>
+    <p1510:client id="{C67D1AEA-47A6-4A85-874C-E195E1AA0068}" v="9" dt="2020-07-25T01:29:10.480"/>
     <p1510:client id="{FED6C4F5-8304-439D-91CC-702946B2ECD6}" v="34" dt="2020-07-24T21:09:25.046"/>
   </p1510:revLst>
 </p1510:revInfo>
@@ -132,18 +133,102 @@
   <pc:docChgLst>
     <pc:chgData name="Benjamin AUBRY" userId="3378e7d37fbb753c" providerId="LiveId" clId="{C67D1AEA-47A6-4A85-874C-E195E1AA0068}"/>
     <pc:docChg chg="undo custSel modSld">
-      <pc:chgData name="Benjamin AUBRY" userId="3378e7d37fbb753c" providerId="LiveId" clId="{C67D1AEA-47A6-4A85-874C-E195E1AA0068}" dt="2020-07-25T00:31:38.767" v="10" actId="20577"/>
+      <pc:chgData name="Benjamin AUBRY" userId="3378e7d37fbb753c" providerId="LiveId" clId="{C67D1AEA-47A6-4A85-874C-E195E1AA0068}" dt="2020-07-25T01:29:10.480" v="41" actId="207"/>
       <pc:docMkLst>
         <pc:docMk/>
       </pc:docMkLst>
+      <pc:sldChg chg="modSp">
+        <pc:chgData name="Benjamin AUBRY" userId="3378e7d37fbb753c" providerId="LiveId" clId="{C67D1AEA-47A6-4A85-874C-E195E1AA0068}" dt="2020-07-25T01:28:23.843" v="34" actId="207"/>
+        <pc:sldMkLst>
+          <pc:docMk/>
+          <pc:sldMk cId="1795393081" sldId="258"/>
+        </pc:sldMkLst>
+        <pc:spChg chg="mod">
+          <ac:chgData name="Benjamin AUBRY" userId="3378e7d37fbb753c" providerId="LiveId" clId="{C67D1AEA-47A6-4A85-874C-E195E1AA0068}" dt="2020-07-25T01:28:23.843" v="34" actId="207"/>
+          <ac:spMkLst>
+            <pc:docMk/>
+            <pc:sldMk cId="1795393081" sldId="258"/>
+            <ac:spMk id="3" creationId="{BA97A59D-0438-4967-9BE0-E79EBDEFE4E2}"/>
+          </ac:spMkLst>
+        </pc:spChg>
+      </pc:sldChg>
       <pc:sldChg chg="modSp mod">
-        <pc:chgData name="Benjamin AUBRY" userId="3378e7d37fbb753c" providerId="LiveId" clId="{C67D1AEA-47A6-4A85-874C-E195E1AA0068}" dt="2020-07-25T00:31:38.767" v="10" actId="20577"/>
+        <pc:chgData name="Benjamin AUBRY" userId="3378e7d37fbb753c" providerId="LiveId" clId="{C67D1AEA-47A6-4A85-874C-E195E1AA0068}" dt="2020-07-25T01:28:33.383" v="35" actId="207"/>
+        <pc:sldMkLst>
+          <pc:docMk/>
+          <pc:sldMk cId="3152759760" sldId="266"/>
+        </pc:sldMkLst>
+        <pc:spChg chg="mod">
+          <ac:chgData name="Benjamin AUBRY" userId="3378e7d37fbb753c" providerId="LiveId" clId="{C67D1AEA-47A6-4A85-874C-E195E1AA0068}" dt="2020-07-25T01:07:08.787" v="20" actId="20577"/>
+          <ac:spMkLst>
+            <pc:docMk/>
+            <pc:sldMk cId="3152759760" sldId="266"/>
+            <ac:spMk id="2" creationId="{4C0BAEDD-75B5-4664-8D67-6B18AC8773C8}"/>
+          </ac:spMkLst>
+        </pc:spChg>
+        <pc:spChg chg="mod">
+          <ac:chgData name="Benjamin AUBRY" userId="3378e7d37fbb753c" providerId="LiveId" clId="{C67D1AEA-47A6-4A85-874C-E195E1AA0068}" dt="2020-07-25T01:28:33.383" v="35" actId="207"/>
+          <ac:spMkLst>
+            <pc:docMk/>
+            <pc:sldMk cId="3152759760" sldId="266"/>
+            <ac:spMk id="3" creationId="{F9373776-0793-4E8F-8A90-8AA6FCB16820}"/>
+          </ac:spMkLst>
+        </pc:spChg>
+      </pc:sldChg>
+      <pc:sldChg chg="modSp mod">
+        <pc:chgData name="Benjamin AUBRY" userId="3378e7d37fbb753c" providerId="LiveId" clId="{C67D1AEA-47A6-4A85-874C-E195E1AA0068}" dt="2020-07-25T01:28:58.530" v="39" actId="207"/>
+        <pc:sldMkLst>
+          <pc:docMk/>
+          <pc:sldMk cId="3527227421" sldId="270"/>
+        </pc:sldMkLst>
+        <pc:spChg chg="mod">
+          <ac:chgData name="Benjamin AUBRY" userId="3378e7d37fbb753c" providerId="LiveId" clId="{C67D1AEA-47A6-4A85-874C-E195E1AA0068}" dt="2020-07-25T01:28:58.530" v="39" actId="207"/>
+          <ac:spMkLst>
+            <pc:docMk/>
+            <pc:sldMk cId="3527227421" sldId="270"/>
+            <ac:spMk id="3" creationId="{F9373776-0793-4E8F-8A90-8AA6FCB16820}"/>
+          </ac:spMkLst>
+        </pc:spChg>
+        <pc:spChg chg="mod">
+          <ac:chgData name="Benjamin AUBRY" userId="3378e7d37fbb753c" providerId="LiveId" clId="{C67D1AEA-47A6-4A85-874C-E195E1AA0068}" dt="2020-07-25T01:09:53.420" v="32" actId="20577"/>
+          <ac:spMkLst>
+            <pc:docMk/>
+            <pc:sldMk cId="3527227421" sldId="270"/>
+            <ac:spMk id="13" creationId="{B8A2AD42-9E31-4716-9974-A678E4536246}"/>
+          </ac:spMkLst>
+        </pc:spChg>
+        <pc:spChg chg="mod">
+          <ac:chgData name="Benjamin AUBRY" userId="3378e7d37fbb753c" providerId="LiveId" clId="{C67D1AEA-47A6-4A85-874C-E195E1AA0068}" dt="2020-07-25T01:28:50.364" v="37" actId="207"/>
+          <ac:spMkLst>
+            <pc:docMk/>
+            <pc:sldMk cId="3527227421" sldId="270"/>
+            <ac:spMk id="15" creationId="{5D5A3701-BBC7-485D-BC4F-9DF688B2D880}"/>
+          </ac:spMkLst>
+        </pc:spChg>
+      </pc:sldChg>
+      <pc:sldChg chg="modSp">
+        <pc:chgData name="Benjamin AUBRY" userId="3378e7d37fbb753c" providerId="LiveId" clId="{C67D1AEA-47A6-4A85-874C-E195E1AA0068}" dt="2020-07-25T01:28:40.809" v="36" actId="207"/>
+        <pc:sldMkLst>
+          <pc:docMk/>
+          <pc:sldMk cId="3218071722" sldId="271"/>
+        </pc:sldMkLst>
+        <pc:spChg chg="mod">
+          <ac:chgData name="Benjamin AUBRY" userId="3378e7d37fbb753c" providerId="LiveId" clId="{C67D1AEA-47A6-4A85-874C-E195E1AA0068}" dt="2020-07-25T01:28:40.809" v="36" actId="207"/>
+          <ac:spMkLst>
+            <pc:docMk/>
+            <pc:sldMk cId="3218071722" sldId="271"/>
+            <ac:spMk id="3" creationId="{F9373776-0793-4E8F-8A90-8AA6FCB16820}"/>
+          </ac:spMkLst>
+        </pc:spChg>
+      </pc:sldChg>
+      <pc:sldChg chg="modSp mod">
+        <pc:chgData name="Benjamin AUBRY" userId="3378e7d37fbb753c" providerId="LiveId" clId="{C67D1AEA-47A6-4A85-874C-E195E1AA0068}" dt="2020-07-25T01:29:10.480" v="41" actId="207"/>
         <pc:sldMkLst>
           <pc:docMk/>
           <pc:sldMk cId="2972374305" sldId="272"/>
         </pc:sldMkLst>
         <pc:spChg chg="mod">
-          <ac:chgData name="Benjamin AUBRY" userId="3378e7d37fbb753c" providerId="LiveId" clId="{C67D1AEA-47A6-4A85-874C-E195E1AA0068}" dt="2020-07-25T00:31:38.767" v="10" actId="20577"/>
+          <ac:chgData name="Benjamin AUBRY" userId="3378e7d37fbb753c" providerId="LiveId" clId="{C67D1AEA-47A6-4A85-874C-E195E1AA0068}" dt="2020-07-25T01:29:10.480" v="41" actId="207"/>
           <ac:spMkLst>
             <pc:docMk/>
             <pc:sldMk cId="2972374305" sldId="272"/>
@@ -836,7 +921,7 @@
           <a:noFill/>
           <a:extLst>
             <a:ext uri="{909E8E84-426E-40dd-AFC4-6F175D3DCCD1}">
-              <a14:hiddenFill xmlns="" xmlns:a14="http://schemas.microsoft.com/office/drawing/2010/main">
+              <a14:hiddenFill xmlns:a14="http://schemas.microsoft.com/office/drawing/2010/main" xmlns="">
                 <a:solidFill>
                   <a:srgbClr val="FFFFFF"/>
                 </a:solidFill>
@@ -895,7 +980,7 @@
             </a:ln>
             <a:extLst>
               <a:ext uri="{91240B29-F687-4f45-9708-019B960494DF}">
-                <a14:hiddenLine xmlns="" xmlns:a14="http://schemas.microsoft.com/office/drawing/2010/main" w="9525">
+                <a14:hiddenLine xmlns:a14="http://schemas.microsoft.com/office/drawing/2010/main" xmlns="" w="9525">
                   <a:solidFill>
                     <a:srgbClr val="000000"/>
                   </a:solidFill>
@@ -985,7 +1070,7 @@
             </a:ln>
             <a:extLst>
               <a:ext uri="{91240B29-F687-4f45-9708-019B960494DF}">
-                <a14:hiddenLine xmlns="" xmlns:a14="http://schemas.microsoft.com/office/drawing/2010/main" w="9525">
+                <a14:hiddenLine xmlns:a14="http://schemas.microsoft.com/office/drawing/2010/main" xmlns="" w="9525">
                   <a:solidFill>
                     <a:srgbClr val="000000"/>
                   </a:solidFill>
@@ -1075,7 +1160,7 @@
             </a:ln>
             <a:extLst>
               <a:ext uri="{91240B29-F687-4f45-9708-019B960494DF}">
-                <a14:hiddenLine xmlns="" xmlns:a14="http://schemas.microsoft.com/office/drawing/2010/main" w="9525">
+                <a14:hiddenLine xmlns:a14="http://schemas.microsoft.com/office/drawing/2010/main" xmlns="" w="9525">
                   <a:solidFill>
                     <a:srgbClr val="000000"/>
                   </a:solidFill>
@@ -1109,7 +1194,7 @@
             </a:ln>
             <a:extLst>
               <a:ext uri="{91240B29-F687-4f45-9708-019B960494DF}">
-                <a14:hiddenLine xmlns="" xmlns:a14="http://schemas.microsoft.com/office/drawing/2010/main" w="9525">
+                <a14:hiddenLine xmlns:a14="http://schemas.microsoft.com/office/drawing/2010/main" xmlns="" w="9525">
                   <a:solidFill>
                     <a:srgbClr val="000000"/>
                   </a:solidFill>
@@ -1199,7 +1284,7 @@
             </a:ln>
             <a:extLst>
               <a:ext uri="{91240B29-F687-4f45-9708-019B960494DF}">
-                <a14:hiddenLine xmlns="" xmlns:a14="http://schemas.microsoft.com/office/drawing/2010/main" w="9525">
+                <a14:hiddenLine xmlns:a14="http://schemas.microsoft.com/office/drawing/2010/main" xmlns="" w="9525">
                   <a:solidFill>
                     <a:srgbClr val="000000"/>
                   </a:solidFill>
@@ -1261,7 +1346,7 @@
             </a:ln>
             <a:extLst>
               <a:ext uri="{91240B29-F687-4f45-9708-019B960494DF}">
-                <a14:hiddenLine xmlns="" xmlns:a14="http://schemas.microsoft.com/office/drawing/2010/main" w="9525">
+                <a14:hiddenLine xmlns:a14="http://schemas.microsoft.com/office/drawing/2010/main" xmlns="" w="9525">
                   <a:solidFill>
                     <a:srgbClr val="000000"/>
                   </a:solidFill>
@@ -1323,7 +1408,7 @@
             </a:ln>
             <a:extLst>
               <a:ext uri="{91240B29-F687-4f45-9708-019B960494DF}">
-                <a14:hiddenLine xmlns="" xmlns:a14="http://schemas.microsoft.com/office/drawing/2010/main" w="9525">
+                <a14:hiddenLine xmlns:a14="http://schemas.microsoft.com/office/drawing/2010/main" xmlns="" w="9525">
                   <a:solidFill>
                     <a:srgbClr val="000000"/>
                   </a:solidFill>
@@ -1413,7 +1498,7 @@
             </a:ln>
             <a:extLst>
               <a:ext uri="{91240B29-F687-4f45-9708-019B960494DF}">
-                <a14:hiddenLine xmlns="" xmlns:a14="http://schemas.microsoft.com/office/drawing/2010/main" w="9525">
+                <a14:hiddenLine xmlns:a14="http://schemas.microsoft.com/office/drawing/2010/main" xmlns="" w="9525">
                   <a:solidFill>
                     <a:srgbClr val="000000"/>
                   </a:solidFill>
@@ -1475,7 +1560,7 @@
             </a:ln>
             <a:extLst>
               <a:ext uri="{91240B29-F687-4f45-9708-019B960494DF}">
-                <a14:hiddenLine xmlns="" xmlns:a14="http://schemas.microsoft.com/office/drawing/2010/main" w="9525">
+                <a14:hiddenLine xmlns:a14="http://schemas.microsoft.com/office/drawing/2010/main" xmlns="" w="9525">
                   <a:solidFill>
                     <a:srgbClr val="000000"/>
                   </a:solidFill>
@@ -1537,7 +1622,7 @@
             </a:ln>
             <a:extLst>
               <a:ext uri="{91240B29-F687-4f45-9708-019B960494DF}">
-                <a14:hiddenLine xmlns="" xmlns:a14="http://schemas.microsoft.com/office/drawing/2010/main" w="9525">
+                <a14:hiddenLine xmlns:a14="http://schemas.microsoft.com/office/drawing/2010/main" xmlns="" w="9525">
                   <a:solidFill>
                     <a:srgbClr val="000000"/>
                   </a:solidFill>
@@ -1627,7 +1712,7 @@
             </a:ln>
             <a:extLst>
               <a:ext uri="{91240B29-F687-4f45-9708-019B960494DF}">
-                <a14:hiddenLine xmlns="" xmlns:a14="http://schemas.microsoft.com/office/drawing/2010/main" w="9525">
+                <a14:hiddenLine xmlns:a14="http://schemas.microsoft.com/office/drawing/2010/main" xmlns="" w="9525">
                   <a:solidFill>
                     <a:srgbClr val="000000"/>
                   </a:solidFill>
@@ -1717,7 +1802,7 @@
             </a:ln>
             <a:extLst>
               <a:ext uri="{91240B29-F687-4f45-9708-019B960494DF}">
-                <a14:hiddenLine xmlns="" xmlns:a14="http://schemas.microsoft.com/office/drawing/2010/main" w="9525">
+                <a14:hiddenLine xmlns:a14="http://schemas.microsoft.com/office/drawing/2010/main" xmlns="" w="9525">
                   <a:solidFill>
                     <a:srgbClr val="000000"/>
                   </a:solidFill>
@@ -1779,7 +1864,7 @@
             </a:ln>
             <a:extLst>
               <a:ext uri="{91240B29-F687-4f45-9708-019B960494DF}">
-                <a14:hiddenLine xmlns="" xmlns:a14="http://schemas.microsoft.com/office/drawing/2010/main" w="9525">
+                <a14:hiddenLine xmlns:a14="http://schemas.microsoft.com/office/drawing/2010/main" xmlns="" w="9525">
                   <a:solidFill>
                     <a:srgbClr val="000000"/>
                   </a:solidFill>
@@ -1889,7 +1974,7 @@
             </a:ln>
             <a:extLst>
               <a:ext uri="{91240B29-F687-4f45-9708-019B960494DF}">
-                <a14:hiddenLine xmlns="" xmlns:a14="http://schemas.microsoft.com/office/drawing/2010/main" w="9525">
+                <a14:hiddenLine xmlns:a14="http://schemas.microsoft.com/office/drawing/2010/main" xmlns="" w="9525">
                   <a:solidFill>
                     <a:srgbClr val="000000"/>
                   </a:solidFill>
@@ -1951,7 +2036,7 @@
             </a:ln>
             <a:extLst>
               <a:ext uri="{91240B29-F687-4f45-9708-019B960494DF}">
-                <a14:hiddenLine xmlns="" xmlns:a14="http://schemas.microsoft.com/office/drawing/2010/main" w="9525">
+                <a14:hiddenLine xmlns:a14="http://schemas.microsoft.com/office/drawing/2010/main" xmlns="" w="9525">
                   <a:solidFill>
                     <a:srgbClr val="000000"/>
                   </a:solidFill>
@@ -2041,7 +2126,7 @@
             </a:ln>
             <a:extLst>
               <a:ext uri="{91240B29-F687-4f45-9708-019B960494DF}">
-                <a14:hiddenLine xmlns="" xmlns:a14="http://schemas.microsoft.com/office/drawing/2010/main" w="9525">
+                <a14:hiddenLine xmlns:a14="http://schemas.microsoft.com/office/drawing/2010/main" xmlns="" w="9525">
                   <a:solidFill>
                     <a:srgbClr val="000000"/>
                   </a:solidFill>
@@ -2131,7 +2216,7 @@
             </a:ln>
             <a:extLst>
               <a:ext uri="{91240B29-F687-4f45-9708-019B960494DF}">
-                <a14:hiddenLine xmlns="" xmlns:a14="http://schemas.microsoft.com/office/drawing/2010/main" w="9525">
+                <a14:hiddenLine xmlns:a14="http://schemas.microsoft.com/office/drawing/2010/main" xmlns="" w="9525">
                   <a:solidFill>
                     <a:srgbClr val="000000"/>
                   </a:solidFill>
@@ -2193,7 +2278,7 @@
             </a:ln>
             <a:extLst>
               <a:ext uri="{91240B29-F687-4f45-9708-019B960494DF}">
-                <a14:hiddenLine xmlns="" xmlns:a14="http://schemas.microsoft.com/office/drawing/2010/main" w="9525">
+                <a14:hiddenLine xmlns:a14="http://schemas.microsoft.com/office/drawing/2010/main" xmlns="" w="9525">
                   <a:solidFill>
                     <a:srgbClr val="000000"/>
                   </a:solidFill>
@@ -2283,7 +2368,7 @@
             </a:ln>
             <a:extLst>
               <a:ext uri="{91240B29-F687-4f45-9708-019B960494DF}">
-                <a14:hiddenLine xmlns="" xmlns:a14="http://schemas.microsoft.com/office/drawing/2010/main" w="9525">
+                <a14:hiddenLine xmlns:a14="http://schemas.microsoft.com/office/drawing/2010/main" xmlns="" w="9525">
                   <a:solidFill>
                     <a:srgbClr val="000000"/>
                   </a:solidFill>
@@ -2373,7 +2458,7 @@
             </a:ln>
             <a:extLst>
               <a:ext uri="{91240B29-F687-4f45-9708-019B960494DF}">
-                <a14:hiddenLine xmlns="" xmlns:a14="http://schemas.microsoft.com/office/drawing/2010/main" w="9525">
+                <a14:hiddenLine xmlns:a14="http://schemas.microsoft.com/office/drawing/2010/main" xmlns="" w="9525">
                   <a:solidFill>
                     <a:srgbClr val="000000"/>
                   </a:solidFill>
@@ -2429,7 +2514,7 @@
             </a:ln>
             <a:extLst>
               <a:ext uri="{91240B29-F687-4f45-9708-019B960494DF}">
-                <a14:hiddenLine xmlns="" xmlns:a14="http://schemas.microsoft.com/office/drawing/2010/main" w="9525">
+                <a14:hiddenLine xmlns:a14="http://schemas.microsoft.com/office/drawing/2010/main" xmlns="" w="9525">
                   <a:solidFill>
                     <a:srgbClr val="000000"/>
                   </a:solidFill>
@@ -2519,7 +2604,7 @@
             </a:ln>
             <a:extLst>
               <a:ext uri="{91240B29-F687-4f45-9708-019B960494DF}">
-                <a14:hiddenLine xmlns="" xmlns:a14="http://schemas.microsoft.com/office/drawing/2010/main" w="9525">
+                <a14:hiddenLine xmlns:a14="http://schemas.microsoft.com/office/drawing/2010/main" xmlns="" w="9525">
                   <a:solidFill>
                     <a:srgbClr val="000000"/>
                   </a:solidFill>
@@ -2575,7 +2660,7 @@
             </a:ln>
             <a:extLst>
               <a:ext uri="{91240B29-F687-4f45-9708-019B960494DF}">
-                <a14:hiddenLine xmlns="" xmlns:a14="http://schemas.microsoft.com/office/drawing/2010/main" w="9525">
+                <a14:hiddenLine xmlns:a14="http://schemas.microsoft.com/office/drawing/2010/main" xmlns="" w="9525">
                   <a:solidFill>
                     <a:srgbClr val="000000"/>
                   </a:solidFill>
@@ -2665,7 +2750,7 @@
             </a:ln>
             <a:extLst>
               <a:ext uri="{91240B29-F687-4f45-9708-019B960494DF}">
-                <a14:hiddenLine xmlns="" xmlns:a14="http://schemas.microsoft.com/office/drawing/2010/main" w="9525">
+                <a14:hiddenLine xmlns:a14="http://schemas.microsoft.com/office/drawing/2010/main" xmlns="" w="9525">
                   <a:solidFill>
                     <a:srgbClr val="000000"/>
                   </a:solidFill>
@@ -2733,7 +2818,7 @@
             </a:ln>
             <a:extLst>
               <a:ext uri="{91240B29-F687-4f45-9708-019B960494DF}">
-                <a14:hiddenLine xmlns="" xmlns:a14="http://schemas.microsoft.com/office/drawing/2010/main" w="9525">
+                <a14:hiddenLine xmlns:a14="http://schemas.microsoft.com/office/drawing/2010/main" xmlns="" w="9525">
                   <a:solidFill>
                     <a:srgbClr val="000000"/>
                   </a:solidFill>
@@ -2823,7 +2908,7 @@
             </a:ln>
             <a:extLst>
               <a:ext uri="{91240B29-F687-4f45-9708-019B960494DF}">
-                <a14:hiddenLine xmlns="" xmlns:a14="http://schemas.microsoft.com/office/drawing/2010/main" w="9525">
+                <a14:hiddenLine xmlns:a14="http://schemas.microsoft.com/office/drawing/2010/main" xmlns="" w="9525">
                   <a:solidFill>
                     <a:srgbClr val="000000"/>
                   </a:solidFill>
@@ -2891,7 +2976,7 @@
             </a:ln>
             <a:extLst>
               <a:ext uri="{91240B29-F687-4f45-9708-019B960494DF}">
-                <a14:hiddenLine xmlns="" xmlns:a14="http://schemas.microsoft.com/office/drawing/2010/main" w="9525">
+                <a14:hiddenLine xmlns:a14="http://schemas.microsoft.com/office/drawing/2010/main" xmlns="" w="9525">
                   <a:solidFill>
                     <a:srgbClr val="000000"/>
                   </a:solidFill>
@@ -2981,7 +3066,7 @@
             </a:ln>
             <a:extLst>
               <a:ext uri="{91240B29-F687-4f45-9708-019B960494DF}">
-                <a14:hiddenLine xmlns="" xmlns:a14="http://schemas.microsoft.com/office/drawing/2010/main" w="9525">
+                <a14:hiddenLine xmlns:a14="http://schemas.microsoft.com/office/drawing/2010/main" xmlns="" w="9525">
                   <a:solidFill>
                     <a:srgbClr val="000000"/>
                   </a:solidFill>
@@ -3015,7 +3100,7 @@
             </a:ln>
             <a:extLst>
               <a:ext uri="{91240B29-F687-4f45-9708-019B960494DF}">
-                <a14:hiddenLine xmlns="" xmlns:a14="http://schemas.microsoft.com/office/drawing/2010/main" w="9525">
+                <a14:hiddenLine xmlns:a14="http://schemas.microsoft.com/office/drawing/2010/main" xmlns="" w="9525">
                   <a:solidFill>
                     <a:srgbClr val="000000"/>
                   </a:solidFill>
@@ -3105,7 +3190,7 @@
             </a:ln>
             <a:extLst>
               <a:ext uri="{91240B29-F687-4f45-9708-019B960494DF}">
-                <a14:hiddenLine xmlns="" xmlns:a14="http://schemas.microsoft.com/office/drawing/2010/main" w="9525">
+                <a14:hiddenLine xmlns:a14="http://schemas.microsoft.com/office/drawing/2010/main" xmlns="" w="9525">
                   <a:solidFill>
                     <a:srgbClr val="000000"/>
                   </a:solidFill>
@@ -3167,7 +3252,7 @@
             </a:ln>
             <a:extLst>
               <a:ext uri="{91240B29-F687-4f45-9708-019B960494DF}">
-                <a14:hiddenLine xmlns="" xmlns:a14="http://schemas.microsoft.com/office/drawing/2010/main" w="9525">
+                <a14:hiddenLine xmlns:a14="http://schemas.microsoft.com/office/drawing/2010/main" xmlns="" w="9525">
                   <a:solidFill>
                     <a:srgbClr val="000000"/>
                   </a:solidFill>
@@ -3229,7 +3314,7 @@
             </a:ln>
             <a:extLst>
               <a:ext uri="{91240B29-F687-4f45-9708-019B960494DF}">
-                <a14:hiddenLine xmlns="" xmlns:a14="http://schemas.microsoft.com/office/drawing/2010/main" w="9525">
+                <a14:hiddenLine xmlns:a14="http://schemas.microsoft.com/office/drawing/2010/main" xmlns="" w="9525">
                   <a:solidFill>
                     <a:srgbClr val="000000"/>
                   </a:solidFill>
@@ -3319,7 +3404,7 @@
             </a:ln>
             <a:extLst>
               <a:ext uri="{91240B29-F687-4f45-9708-019B960494DF}">
-                <a14:hiddenLine xmlns="" xmlns:a14="http://schemas.microsoft.com/office/drawing/2010/main" w="9525">
+                <a14:hiddenLine xmlns:a14="http://schemas.microsoft.com/office/drawing/2010/main" xmlns="" w="9525">
                   <a:solidFill>
                     <a:srgbClr val="000000"/>
                   </a:solidFill>
@@ -3387,7 +3472,7 @@
             </a:ln>
             <a:extLst>
               <a:ext uri="{91240B29-F687-4f45-9708-019B960494DF}">
-                <a14:hiddenLine xmlns="" xmlns:a14="http://schemas.microsoft.com/office/drawing/2010/main" w="9525">
+                <a14:hiddenLine xmlns:a14="http://schemas.microsoft.com/office/drawing/2010/main" xmlns="" w="9525">
                   <a:solidFill>
                     <a:srgbClr val="000000"/>
                   </a:solidFill>
@@ -3449,7 +3534,7 @@
             </a:ln>
             <a:extLst>
               <a:ext uri="{91240B29-F687-4f45-9708-019B960494DF}">
-                <a14:hiddenLine xmlns="" xmlns:a14="http://schemas.microsoft.com/office/drawing/2010/main" w="9525">
+                <a14:hiddenLine xmlns:a14="http://schemas.microsoft.com/office/drawing/2010/main" xmlns="" w="9525">
                   <a:solidFill>
                     <a:srgbClr val="000000"/>
                   </a:solidFill>
@@ -3539,7 +3624,7 @@
             </a:ln>
             <a:extLst>
               <a:ext uri="{91240B29-F687-4f45-9708-019B960494DF}">
-                <a14:hiddenLine xmlns="" xmlns:a14="http://schemas.microsoft.com/office/drawing/2010/main" w="9525">
+                <a14:hiddenLine xmlns:a14="http://schemas.microsoft.com/office/drawing/2010/main" xmlns="" w="9525">
                   <a:solidFill>
                     <a:srgbClr val="000000"/>
                   </a:solidFill>
@@ -3601,7 +3686,7 @@
             </a:ln>
             <a:extLst>
               <a:ext uri="{91240B29-F687-4f45-9708-019B960494DF}">
-                <a14:hiddenLine xmlns="" xmlns:a14="http://schemas.microsoft.com/office/drawing/2010/main" w="9525">
+                <a14:hiddenLine xmlns:a14="http://schemas.microsoft.com/office/drawing/2010/main" xmlns="" w="9525">
                   <a:solidFill>
                     <a:srgbClr val="000000"/>
                   </a:solidFill>
@@ -3691,7 +3776,7 @@
             </a:ln>
             <a:extLst>
               <a:ext uri="{91240B29-F687-4f45-9708-019B960494DF}">
-                <a14:hiddenLine xmlns="" xmlns:a14="http://schemas.microsoft.com/office/drawing/2010/main" w="9525">
+                <a14:hiddenLine xmlns:a14="http://schemas.microsoft.com/office/drawing/2010/main" xmlns="" w="9525">
                   <a:solidFill>
                     <a:srgbClr val="000000"/>
                   </a:solidFill>
@@ -3753,7 +3838,7 @@
             </a:ln>
             <a:extLst>
               <a:ext uri="{91240B29-F687-4f45-9708-019B960494DF}">
-                <a14:hiddenLine xmlns="" xmlns:a14="http://schemas.microsoft.com/office/drawing/2010/main" w="9525">
+                <a14:hiddenLine xmlns:a14="http://schemas.microsoft.com/office/drawing/2010/main" xmlns="" w="9525">
                   <a:solidFill>
                     <a:srgbClr val="000000"/>
                   </a:solidFill>
@@ -3843,7 +3928,7 @@
             </a:ln>
             <a:extLst>
               <a:ext uri="{91240B29-F687-4f45-9708-019B960494DF}">
-                <a14:hiddenLine xmlns="" xmlns:a14="http://schemas.microsoft.com/office/drawing/2010/main" w="9525">
+                <a14:hiddenLine xmlns:a14="http://schemas.microsoft.com/office/drawing/2010/main" xmlns="" w="9525">
                   <a:solidFill>
                     <a:srgbClr val="000000"/>
                   </a:solidFill>
@@ -3877,7 +3962,7 @@
             </a:ln>
             <a:extLst>
               <a:ext uri="{91240B29-F687-4f45-9708-019B960494DF}">
-                <a14:hiddenLine xmlns="" xmlns:a14="http://schemas.microsoft.com/office/drawing/2010/main" w="9525">
+                <a14:hiddenLine xmlns:a14="http://schemas.microsoft.com/office/drawing/2010/main" xmlns="" w="9525">
                   <a:solidFill>
                     <a:srgbClr val="000000"/>
                   </a:solidFill>
@@ -3942,7 +4027,7 @@
             </a:ln>
             <a:extLst>
               <a:ext uri="{91240B29-F687-4f45-9708-019B960494DF}">
-                <a14:hiddenLine xmlns="" xmlns:a14="http://schemas.microsoft.com/office/drawing/2010/main" w="9525">
+                <a14:hiddenLine xmlns:a14="http://schemas.microsoft.com/office/drawing/2010/main" xmlns="" w="9525">
                   <a:solidFill>
                     <a:srgbClr val="000000"/>
                   </a:solidFill>
@@ -4032,7 +4117,7 @@
             </a:ln>
             <a:extLst>
               <a:ext uri="{91240B29-F687-4f45-9708-019B960494DF}">
-                <a14:hiddenLine xmlns="" xmlns:a14="http://schemas.microsoft.com/office/drawing/2010/main" w="9525">
+                <a14:hiddenLine xmlns:a14="http://schemas.microsoft.com/office/drawing/2010/main" xmlns="" w="9525">
                   <a:solidFill>
                     <a:srgbClr val="000000"/>
                   </a:solidFill>
@@ -4094,7 +4179,7 @@
             </a:ln>
             <a:extLst>
               <a:ext uri="{91240B29-F687-4f45-9708-019B960494DF}">
-                <a14:hiddenLine xmlns="" xmlns:a14="http://schemas.microsoft.com/office/drawing/2010/main" w="9525">
+                <a14:hiddenLine xmlns:a14="http://schemas.microsoft.com/office/drawing/2010/main" xmlns="" w="9525">
                   <a:solidFill>
                     <a:srgbClr val="000000"/>
                   </a:solidFill>
@@ -4184,7 +4269,7 @@
             </a:ln>
             <a:extLst>
               <a:ext uri="{91240B29-F687-4f45-9708-019B960494DF}">
-                <a14:hiddenLine xmlns="" xmlns:a14="http://schemas.microsoft.com/office/drawing/2010/main" w="9525">
+                <a14:hiddenLine xmlns:a14="http://schemas.microsoft.com/office/drawing/2010/main" xmlns="" w="9525">
                   <a:solidFill>
                     <a:srgbClr val="000000"/>
                   </a:solidFill>
@@ -4274,7 +4359,7 @@
             </a:ln>
             <a:extLst>
               <a:ext uri="{91240B29-F687-4f45-9708-019B960494DF}">
-                <a14:hiddenLine xmlns="" xmlns:a14="http://schemas.microsoft.com/office/drawing/2010/main" w="9525">
+                <a14:hiddenLine xmlns:a14="http://schemas.microsoft.com/office/drawing/2010/main" xmlns="" w="9525">
                   <a:solidFill>
                     <a:srgbClr val="000000"/>
                   </a:solidFill>
@@ -4339,7 +4424,7 @@
             </a:ln>
             <a:extLst>
               <a:ext uri="{91240B29-F687-4f45-9708-019B960494DF}">
-                <a14:hiddenLine xmlns="" xmlns:a14="http://schemas.microsoft.com/office/drawing/2010/main" w="9525">
+                <a14:hiddenLine xmlns:a14="http://schemas.microsoft.com/office/drawing/2010/main" xmlns="" w="9525">
                   <a:solidFill>
                     <a:srgbClr val="000000"/>
                   </a:solidFill>
@@ -4401,7 +4486,7 @@
             </a:ln>
             <a:extLst>
               <a:ext uri="{91240B29-F687-4f45-9708-019B960494DF}">
-                <a14:hiddenLine xmlns="" xmlns:a14="http://schemas.microsoft.com/office/drawing/2010/main" w="9525">
+                <a14:hiddenLine xmlns:a14="http://schemas.microsoft.com/office/drawing/2010/main" xmlns="" w="9525">
                   <a:solidFill>
                     <a:srgbClr val="000000"/>
                   </a:solidFill>
@@ -4491,7 +4576,7 @@
             </a:ln>
             <a:extLst>
               <a:ext uri="{91240B29-F687-4f45-9708-019B960494DF}">
-                <a14:hiddenLine xmlns="" xmlns:a14="http://schemas.microsoft.com/office/drawing/2010/main" w="9525">
+                <a14:hiddenLine xmlns:a14="http://schemas.microsoft.com/office/drawing/2010/main" xmlns="" w="9525">
                   <a:solidFill>
                     <a:srgbClr val="000000"/>
                   </a:solidFill>
@@ -4581,7 +4666,7 @@
             </a:ln>
             <a:extLst>
               <a:ext uri="{91240B29-F687-4f45-9708-019B960494DF}">
-                <a14:hiddenLine xmlns="" xmlns:a14="http://schemas.microsoft.com/office/drawing/2010/main" w="9525">
+                <a14:hiddenLine xmlns:a14="http://schemas.microsoft.com/office/drawing/2010/main" xmlns="" w="9525">
                   <a:solidFill>
                     <a:srgbClr val="000000"/>
                   </a:solidFill>
@@ -4643,7 +4728,7 @@
             </a:ln>
             <a:extLst>
               <a:ext uri="{91240B29-F687-4f45-9708-019B960494DF}">
-                <a14:hiddenLine xmlns="" xmlns:a14="http://schemas.microsoft.com/office/drawing/2010/main" w="9525">
+                <a14:hiddenLine xmlns:a14="http://schemas.microsoft.com/office/drawing/2010/main" xmlns="" w="9525">
                   <a:solidFill>
                     <a:srgbClr val="000000"/>
                   </a:solidFill>
@@ -4763,7 +4848,7 @@
             </a:ln>
             <a:extLst>
               <a:ext uri="{91240B29-F687-4f45-9708-019B960494DF}">
-                <a14:hiddenLine xmlns="" xmlns:a14="http://schemas.microsoft.com/office/drawing/2010/main" w="9525">
+                <a14:hiddenLine xmlns:a14="http://schemas.microsoft.com/office/drawing/2010/main" xmlns="" w="9525">
                   <a:solidFill>
                     <a:srgbClr val="000000"/>
                   </a:solidFill>
@@ -4831,7 +4916,7 @@
             </a:ln>
             <a:extLst>
               <a:ext uri="{91240B29-F687-4f45-9708-019B960494DF}">
-                <a14:hiddenLine xmlns="" xmlns:a14="http://schemas.microsoft.com/office/drawing/2010/main" w="9525">
+                <a14:hiddenLine xmlns:a14="http://schemas.microsoft.com/office/drawing/2010/main" xmlns="" w="9525">
                   <a:solidFill>
                     <a:srgbClr val="000000"/>
                   </a:solidFill>
@@ -4921,7 +5006,7 @@
             </a:ln>
             <a:extLst>
               <a:ext uri="{91240B29-F687-4f45-9708-019B960494DF}">
-                <a14:hiddenLine xmlns="" xmlns:a14="http://schemas.microsoft.com/office/drawing/2010/main" w="9525">
+                <a14:hiddenLine xmlns:a14="http://schemas.microsoft.com/office/drawing/2010/main" xmlns="" w="9525">
                   <a:solidFill>
                     <a:srgbClr val="000000"/>
                   </a:solidFill>
@@ -9650,7 +9735,7 @@
           <a:noFill/>
           <a:extLst>
             <a:ext uri="{909E8E84-426E-40dd-AFC4-6F175D3DCCD1}">
-              <a14:hiddenFill xmlns="" xmlns:a14="http://schemas.microsoft.com/office/drawing/2010/main">
+              <a14:hiddenFill xmlns:a14="http://schemas.microsoft.com/office/drawing/2010/main" xmlns="">
                 <a:solidFill>
                   <a:srgbClr val="FFFFFF"/>
                 </a:solidFill>
@@ -9724,7 +9809,7 @@
               </a:ln>
               <a:extLst>
                 <a:ext uri="{91240B29-F687-4f45-9708-019B960494DF}">
-                  <a14:hiddenLine xmlns="" xmlns:a14="http://schemas.microsoft.com/office/drawing/2010/main" w="9525">
+                  <a14:hiddenLine xmlns:a14="http://schemas.microsoft.com/office/drawing/2010/main" xmlns="" w="9525">
                     <a:solidFill>
                       <a:srgbClr val="000000"/>
                     </a:solidFill>
@@ -9814,7 +9899,7 @@
               </a:ln>
               <a:extLst>
                 <a:ext uri="{91240B29-F687-4f45-9708-019B960494DF}">
-                  <a14:hiddenLine xmlns="" xmlns:a14="http://schemas.microsoft.com/office/drawing/2010/main" w="9525">
+                  <a14:hiddenLine xmlns:a14="http://schemas.microsoft.com/office/drawing/2010/main" xmlns="" w="9525">
                     <a:solidFill>
                       <a:srgbClr val="000000"/>
                     </a:solidFill>
@@ -9904,7 +9989,7 @@
               </a:ln>
               <a:extLst>
                 <a:ext uri="{91240B29-F687-4f45-9708-019B960494DF}">
-                  <a14:hiddenLine xmlns="" xmlns:a14="http://schemas.microsoft.com/office/drawing/2010/main" w="9525">
+                  <a14:hiddenLine xmlns:a14="http://schemas.microsoft.com/office/drawing/2010/main" xmlns="" w="9525">
                     <a:solidFill>
                       <a:srgbClr val="000000"/>
                     </a:solidFill>
@@ -9966,7 +10051,7 @@
               </a:ln>
               <a:extLst>
                 <a:ext uri="{91240B29-F687-4f45-9708-019B960494DF}">
-                  <a14:hiddenLine xmlns="" xmlns:a14="http://schemas.microsoft.com/office/drawing/2010/main" w="9525">
+                  <a14:hiddenLine xmlns:a14="http://schemas.microsoft.com/office/drawing/2010/main" xmlns="" w="9525">
                     <a:solidFill>
                       <a:srgbClr val="000000"/>
                     </a:solidFill>
@@ -10056,7 +10141,7 @@
               </a:ln>
               <a:extLst>
                 <a:ext uri="{91240B29-F687-4f45-9708-019B960494DF}">
-                  <a14:hiddenLine xmlns="" xmlns:a14="http://schemas.microsoft.com/office/drawing/2010/main" w="9525">
+                  <a14:hiddenLine xmlns:a14="http://schemas.microsoft.com/office/drawing/2010/main" xmlns="" w="9525">
                     <a:solidFill>
                       <a:srgbClr val="000000"/>
                     </a:solidFill>
@@ -10118,7 +10203,7 @@
               </a:ln>
               <a:extLst>
                 <a:ext uri="{91240B29-F687-4f45-9708-019B960494DF}">
-                  <a14:hiddenLine xmlns="" xmlns:a14="http://schemas.microsoft.com/office/drawing/2010/main" w="9525">
+                  <a14:hiddenLine xmlns:a14="http://schemas.microsoft.com/office/drawing/2010/main" xmlns="" w="9525">
                     <a:solidFill>
                       <a:srgbClr val="000000"/>
                     </a:solidFill>
@@ -10180,7 +10265,7 @@
               </a:ln>
               <a:extLst>
                 <a:ext uri="{91240B29-F687-4f45-9708-019B960494DF}">
-                  <a14:hiddenLine xmlns="" xmlns:a14="http://schemas.microsoft.com/office/drawing/2010/main" w="9525">
+                  <a14:hiddenLine xmlns:a14="http://schemas.microsoft.com/office/drawing/2010/main" xmlns="" w="9525">
                     <a:solidFill>
                       <a:srgbClr val="000000"/>
                     </a:solidFill>
@@ -10270,7 +10355,7 @@
               </a:ln>
               <a:extLst>
                 <a:ext uri="{91240B29-F687-4f45-9708-019B960494DF}">
-                  <a14:hiddenLine xmlns="" xmlns:a14="http://schemas.microsoft.com/office/drawing/2010/main" w="9525">
+                  <a14:hiddenLine xmlns:a14="http://schemas.microsoft.com/office/drawing/2010/main" xmlns="" w="9525">
                     <a:solidFill>
                       <a:srgbClr val="000000"/>
                     </a:solidFill>
@@ -10360,7 +10445,7 @@
               </a:ln>
               <a:extLst>
                 <a:ext uri="{91240B29-F687-4f45-9708-019B960494DF}">
-                  <a14:hiddenLine xmlns="" xmlns:a14="http://schemas.microsoft.com/office/drawing/2010/main" w="9525">
+                  <a14:hiddenLine xmlns:a14="http://schemas.microsoft.com/office/drawing/2010/main" xmlns="" w="9525">
                     <a:solidFill>
                       <a:srgbClr val="000000"/>
                     </a:solidFill>
@@ -10422,7 +10507,7 @@
               </a:ln>
               <a:extLst>
                 <a:ext uri="{91240B29-F687-4f45-9708-019B960494DF}">
-                  <a14:hiddenLine xmlns="" xmlns:a14="http://schemas.microsoft.com/office/drawing/2010/main" w="9525">
+                  <a14:hiddenLine xmlns:a14="http://schemas.microsoft.com/office/drawing/2010/main" xmlns="" w="9525">
                     <a:solidFill>
                       <a:srgbClr val="000000"/>
                     </a:solidFill>
@@ -10532,7 +10617,7 @@
               </a:ln>
               <a:extLst>
                 <a:ext uri="{91240B29-F687-4f45-9708-019B960494DF}">
-                  <a14:hiddenLine xmlns="" xmlns:a14="http://schemas.microsoft.com/office/drawing/2010/main" w="9525">
+                  <a14:hiddenLine xmlns:a14="http://schemas.microsoft.com/office/drawing/2010/main" xmlns="" w="9525">
                     <a:solidFill>
                       <a:srgbClr val="000000"/>
                     </a:solidFill>
@@ -10616,7 +10701,7 @@
               </a:ln>
               <a:extLst>
                 <a:ext uri="{91240B29-F687-4f45-9708-019B960494DF}">
-                  <a14:hiddenLine xmlns="" xmlns:a14="http://schemas.microsoft.com/office/drawing/2010/main" w="9525">
+                  <a14:hiddenLine xmlns:a14="http://schemas.microsoft.com/office/drawing/2010/main" xmlns="" w="9525">
                     <a:solidFill>
                       <a:srgbClr val="000000"/>
                     </a:solidFill>
@@ -10678,7 +10763,7 @@
               </a:ln>
               <a:extLst>
                 <a:ext uri="{91240B29-F687-4f45-9708-019B960494DF}">
-                  <a14:hiddenLine xmlns="" xmlns:a14="http://schemas.microsoft.com/office/drawing/2010/main" w="9525">
+                  <a14:hiddenLine xmlns:a14="http://schemas.microsoft.com/office/drawing/2010/main" xmlns="" w="9525">
                     <a:solidFill>
                       <a:srgbClr val="000000"/>
                     </a:solidFill>
@@ -10740,7 +10825,7 @@
               </a:ln>
               <a:extLst>
                 <a:ext uri="{91240B29-F687-4f45-9708-019B960494DF}">
-                  <a14:hiddenLine xmlns="" xmlns:a14="http://schemas.microsoft.com/office/drawing/2010/main" w="9525">
+                  <a14:hiddenLine xmlns:a14="http://schemas.microsoft.com/office/drawing/2010/main" xmlns="" w="9525">
                     <a:solidFill>
                       <a:srgbClr val="000000"/>
                     </a:solidFill>
@@ -10830,7 +10915,7 @@
               </a:ln>
               <a:extLst>
                 <a:ext uri="{91240B29-F687-4f45-9708-019B960494DF}">
-                  <a14:hiddenLine xmlns="" xmlns:a14="http://schemas.microsoft.com/office/drawing/2010/main" w="9525">
+                  <a14:hiddenLine xmlns:a14="http://schemas.microsoft.com/office/drawing/2010/main" xmlns="" w="9525">
                     <a:solidFill>
                       <a:srgbClr val="000000"/>
                     </a:solidFill>
@@ -10864,7 +10949,7 @@
               </a:ln>
               <a:extLst>
                 <a:ext uri="{91240B29-F687-4f45-9708-019B960494DF}">
-                  <a14:hiddenLine xmlns="" xmlns:a14="http://schemas.microsoft.com/office/drawing/2010/main" w="9525">
+                  <a14:hiddenLine xmlns:a14="http://schemas.microsoft.com/office/drawing/2010/main" xmlns="" w="9525">
                     <a:solidFill>
                       <a:srgbClr val="000000"/>
                     </a:solidFill>
@@ -10929,7 +11014,7 @@
               </a:ln>
               <a:extLst>
                 <a:ext uri="{91240B29-F687-4f45-9708-019B960494DF}">
-                  <a14:hiddenLine xmlns="" xmlns:a14="http://schemas.microsoft.com/office/drawing/2010/main" w="9525">
+                  <a14:hiddenLine xmlns:a14="http://schemas.microsoft.com/office/drawing/2010/main" xmlns="" w="9525">
                     <a:solidFill>
                       <a:srgbClr val="000000"/>
                     </a:solidFill>
@@ -11019,7 +11104,7 @@
               </a:ln>
               <a:extLst>
                 <a:ext uri="{91240B29-F687-4f45-9708-019B960494DF}">
-                  <a14:hiddenLine xmlns="" xmlns:a14="http://schemas.microsoft.com/office/drawing/2010/main" w="9525">
+                  <a14:hiddenLine xmlns:a14="http://schemas.microsoft.com/office/drawing/2010/main" xmlns="" w="9525">
                     <a:solidFill>
                       <a:srgbClr val="000000"/>
                     </a:solidFill>
@@ -11081,7 +11166,7 @@
               </a:ln>
               <a:extLst>
                 <a:ext uri="{91240B29-F687-4f45-9708-019B960494DF}">
-                  <a14:hiddenLine xmlns="" xmlns:a14="http://schemas.microsoft.com/office/drawing/2010/main" w="9525">
+                  <a14:hiddenLine xmlns:a14="http://schemas.microsoft.com/office/drawing/2010/main" xmlns="" w="9525">
                     <a:solidFill>
                       <a:srgbClr val="000000"/>
                     </a:solidFill>
@@ -11171,7 +11256,7 @@
               </a:ln>
               <a:extLst>
                 <a:ext uri="{91240B29-F687-4f45-9708-019B960494DF}">
-                  <a14:hiddenLine xmlns="" xmlns:a14="http://schemas.microsoft.com/office/drawing/2010/main" w="9525">
+                  <a14:hiddenLine xmlns:a14="http://schemas.microsoft.com/office/drawing/2010/main" xmlns="" w="9525">
                     <a:solidFill>
                       <a:srgbClr val="000000"/>
                     </a:solidFill>
@@ -11236,7 +11321,7 @@
               </a:ln>
               <a:extLst>
                 <a:ext uri="{91240B29-F687-4f45-9708-019B960494DF}">
-                  <a14:hiddenLine xmlns="" xmlns:a14="http://schemas.microsoft.com/office/drawing/2010/main" w="9525">
+                  <a14:hiddenLine xmlns:a14="http://schemas.microsoft.com/office/drawing/2010/main" xmlns="" w="9525">
                     <a:solidFill>
                       <a:srgbClr val="000000"/>
                     </a:solidFill>
@@ -11298,7 +11383,7 @@
               </a:ln>
               <a:extLst>
                 <a:ext uri="{91240B29-F687-4f45-9708-019B960494DF}">
-                  <a14:hiddenLine xmlns="" xmlns:a14="http://schemas.microsoft.com/office/drawing/2010/main" w="9525">
+                  <a14:hiddenLine xmlns:a14="http://schemas.microsoft.com/office/drawing/2010/main" xmlns="" w="9525">
                     <a:solidFill>
                       <a:srgbClr val="000000"/>
                     </a:solidFill>
@@ -11388,7 +11473,7 @@
               </a:ln>
               <a:extLst>
                 <a:ext uri="{91240B29-F687-4f45-9708-019B960494DF}">
-                  <a14:hiddenLine xmlns="" xmlns:a14="http://schemas.microsoft.com/office/drawing/2010/main" w="9525">
+                  <a14:hiddenLine xmlns:a14="http://schemas.microsoft.com/office/drawing/2010/main" xmlns="" w="9525">
                     <a:solidFill>
                       <a:srgbClr val="000000"/>
                     </a:solidFill>
@@ -11478,7 +11563,7 @@
               </a:ln>
               <a:extLst>
                 <a:ext uri="{91240B29-F687-4f45-9708-019B960494DF}">
-                  <a14:hiddenLine xmlns="" xmlns:a14="http://schemas.microsoft.com/office/drawing/2010/main" w="9525">
+                  <a14:hiddenLine xmlns:a14="http://schemas.microsoft.com/office/drawing/2010/main" xmlns="" w="9525">
                     <a:solidFill>
                       <a:srgbClr val="000000"/>
                     </a:solidFill>
@@ -11543,7 +11628,7 @@
               </a:ln>
               <a:extLst>
                 <a:ext uri="{91240B29-F687-4f45-9708-019B960494DF}">
-                  <a14:hiddenLine xmlns="" xmlns:a14="http://schemas.microsoft.com/office/drawing/2010/main" w="9525">
+                  <a14:hiddenLine xmlns:a14="http://schemas.microsoft.com/office/drawing/2010/main" xmlns="" w="9525">
                     <a:solidFill>
                       <a:srgbClr val="000000"/>
                     </a:solidFill>
@@ -11663,7 +11748,7 @@
               </a:ln>
               <a:extLst>
                 <a:ext uri="{91240B29-F687-4f45-9708-019B960494DF}">
-                  <a14:hiddenLine xmlns="" xmlns:a14="http://schemas.microsoft.com/office/drawing/2010/main" w="9525">
+                  <a14:hiddenLine xmlns:a14="http://schemas.microsoft.com/office/drawing/2010/main" xmlns="" w="9525">
                     <a:solidFill>
                       <a:srgbClr val="000000"/>
                     </a:solidFill>
@@ -11744,7 +11829,7 @@
               </a:ln>
               <a:extLst>
                 <a:ext uri="{91240B29-F687-4f45-9708-019B960494DF}">
-                  <a14:hiddenLine xmlns="" xmlns:a14="http://schemas.microsoft.com/office/drawing/2010/main" w="9525">
+                  <a14:hiddenLine xmlns:a14="http://schemas.microsoft.com/office/drawing/2010/main" xmlns="" w="9525">
                     <a:solidFill>
                       <a:srgbClr val="000000"/>
                     </a:solidFill>
@@ -11859,7 +11944,7 @@
               </a:ln>
               <a:extLst>
                 <a:ext uri="{91240B29-F687-4f45-9708-019B960494DF}">
-                  <a14:hiddenLine xmlns="" xmlns:a14="http://schemas.microsoft.com/office/drawing/2010/main" w="9525">
+                  <a14:hiddenLine xmlns:a14="http://schemas.microsoft.com/office/drawing/2010/main" xmlns="" w="9525">
                     <a:solidFill>
                       <a:srgbClr val="000000"/>
                     </a:solidFill>
@@ -11949,7 +12034,7 @@
               </a:ln>
               <a:extLst>
                 <a:ext uri="{91240B29-F687-4f45-9708-019B960494DF}">
-                  <a14:hiddenLine xmlns="" xmlns:a14="http://schemas.microsoft.com/office/drawing/2010/main" w="9525">
+                  <a14:hiddenLine xmlns:a14="http://schemas.microsoft.com/office/drawing/2010/main" xmlns="" w="9525">
                     <a:solidFill>
                       <a:srgbClr val="000000"/>
                     </a:solidFill>
@@ -12014,7 +12099,7 @@
               </a:ln>
               <a:extLst>
                 <a:ext uri="{91240B29-F687-4f45-9708-019B960494DF}">
-                  <a14:hiddenLine xmlns="" xmlns:a14="http://schemas.microsoft.com/office/drawing/2010/main" w="9525">
+                  <a14:hiddenLine xmlns:a14="http://schemas.microsoft.com/office/drawing/2010/main" xmlns="" w="9525">
                     <a:solidFill>
                       <a:srgbClr val="000000"/>
                     </a:solidFill>
@@ -12104,7 +12189,7 @@
               </a:ln>
               <a:extLst>
                 <a:ext uri="{91240B29-F687-4f45-9708-019B960494DF}">
-                  <a14:hiddenLine xmlns="" xmlns:a14="http://schemas.microsoft.com/office/drawing/2010/main" w="9525">
+                  <a14:hiddenLine xmlns:a14="http://schemas.microsoft.com/office/drawing/2010/main" xmlns="" w="9525">
                     <a:solidFill>
                       <a:srgbClr val="000000"/>
                     </a:solidFill>
@@ -12172,7 +12257,7 @@
               </a:ln>
               <a:extLst>
                 <a:ext uri="{91240B29-F687-4f45-9708-019B960494DF}">
-                  <a14:hiddenLine xmlns="" xmlns:a14="http://schemas.microsoft.com/office/drawing/2010/main" w="9525">
+                  <a14:hiddenLine xmlns:a14="http://schemas.microsoft.com/office/drawing/2010/main" xmlns="" w="9525">
                     <a:solidFill>
                       <a:srgbClr val="000000"/>
                     </a:solidFill>
@@ -12262,7 +12347,7 @@
               </a:ln>
               <a:extLst>
                 <a:ext uri="{91240B29-F687-4f45-9708-019B960494DF}">
-                  <a14:hiddenLine xmlns="" xmlns:a14="http://schemas.microsoft.com/office/drawing/2010/main" w="9525">
+                  <a14:hiddenLine xmlns:a14="http://schemas.microsoft.com/office/drawing/2010/main" xmlns="" w="9525">
                     <a:solidFill>
                       <a:srgbClr val="000000"/>
                     </a:solidFill>
@@ -12330,7 +12415,7 @@
               </a:ln>
               <a:extLst>
                 <a:ext uri="{91240B29-F687-4f45-9708-019B960494DF}">
-                  <a14:hiddenLine xmlns="" xmlns:a14="http://schemas.microsoft.com/office/drawing/2010/main" w="9525">
+                  <a14:hiddenLine xmlns:a14="http://schemas.microsoft.com/office/drawing/2010/main" xmlns="" w="9525">
                     <a:solidFill>
                       <a:srgbClr val="000000"/>
                     </a:solidFill>
@@ -12420,7 +12505,7 @@
               </a:ln>
               <a:extLst>
                 <a:ext uri="{91240B29-F687-4f45-9708-019B960494DF}">
-                  <a14:hiddenLine xmlns="" xmlns:a14="http://schemas.microsoft.com/office/drawing/2010/main" w="9525">
+                  <a14:hiddenLine xmlns:a14="http://schemas.microsoft.com/office/drawing/2010/main" xmlns="" w="9525">
                     <a:solidFill>
                       <a:srgbClr val="000000"/>
                     </a:solidFill>
@@ -12454,7 +12539,7 @@
               </a:ln>
               <a:extLst>
                 <a:ext uri="{91240B29-F687-4f45-9708-019B960494DF}">
-                  <a14:hiddenLine xmlns="" xmlns:a14="http://schemas.microsoft.com/office/drawing/2010/main" w="9525">
+                  <a14:hiddenLine xmlns:a14="http://schemas.microsoft.com/office/drawing/2010/main" xmlns="" w="9525">
                     <a:solidFill>
                       <a:srgbClr val="000000"/>
                     </a:solidFill>
@@ -13181,8 +13266,8 @@
             <a:r>
               <a:rPr lang="en-US" sz="1600" dirty="0">
                 <a:solidFill>
-                  <a:schemeClr val="accent2">
-                    <a:lumMod val="75000"/>
+                  <a:schemeClr val="tx1">
+                    <a:lumMod val="95000"/>
                   </a:schemeClr>
                 </a:solidFill>
               </a:rPr>
@@ -13201,8 +13286,8 @@
             <a:r>
               <a:rPr lang="en-US" sz="1500" dirty="0">
                 <a:solidFill>
-                  <a:schemeClr val="accent2">
-                    <a:lumMod val="75000"/>
+                  <a:schemeClr val="tx1">
+                    <a:lumMod val="95000"/>
                   </a:schemeClr>
                 </a:solidFill>
               </a:rPr>
@@ -13214,8 +13299,8 @@
             <a:r>
               <a:rPr lang="en-US" sz="1500" dirty="0">
                 <a:solidFill>
-                  <a:schemeClr val="accent2">
-                    <a:lumMod val="75000"/>
+                  <a:schemeClr val="tx1">
+                    <a:lumMod val="95000"/>
                   </a:schemeClr>
                 </a:solidFill>
               </a:rPr>
@@ -13227,8 +13312,8 @@
             <a:r>
               <a:rPr lang="en-US" sz="1500" dirty="0">
                 <a:solidFill>
-                  <a:schemeClr val="accent2">
-                    <a:lumMod val="75000"/>
+                  <a:schemeClr val="tx1">
+                    <a:lumMod val="95000"/>
                   </a:schemeClr>
                 </a:solidFill>
               </a:rPr>
@@ -13447,7 +13532,7 @@
             <a:pPr algn="ctr"/>
             <a:r>
               <a:rPr lang="en-US" sz="2600" dirty="0"/>
-              <a:t>LogiSTIC REGRESSION – feeding all data (Raw + featured)</a:t>
+              <a:t>LogiSTIC REGRESSION – feeding all data (Raw + ENGINEERED)</a:t>
             </a:r>
           </a:p>
         </p:txBody>
@@ -13483,8 +13568,8 @@
             <a:r>
               <a:rPr lang="en-US" sz="1900" dirty="0">
                 <a:solidFill>
-                  <a:schemeClr val="accent2">
-                    <a:lumMod val="75000"/>
+                  <a:schemeClr val="tx1">
+                    <a:lumMod val="95000"/>
                   </a:schemeClr>
                 </a:solidFill>
               </a:rPr>
@@ -13495,8 +13580,8 @@
             <a:r>
               <a:rPr lang="en-US" sz="1900" dirty="0">
                 <a:solidFill>
-                  <a:schemeClr val="accent2">
-                    <a:lumMod val="75000"/>
+                  <a:schemeClr val="tx1">
+                    <a:lumMod val="95000"/>
                   </a:schemeClr>
                 </a:solidFill>
               </a:rPr>
@@ -13507,8 +13592,8 @@
             <a:r>
               <a:rPr lang="en-US" sz="1900" dirty="0">
                 <a:solidFill>
-                  <a:schemeClr val="accent2">
-                    <a:lumMod val="75000"/>
+                  <a:schemeClr val="tx1">
+                    <a:lumMod val="95000"/>
                   </a:schemeClr>
                 </a:solidFill>
               </a:rPr>
@@ -13519,12 +13604,44 @@
             <a:r>
               <a:rPr lang="en-US" sz="1900" dirty="0">
                 <a:solidFill>
-                  <a:schemeClr val="accent2">
-                    <a:lumMod val="75000"/>
+                  <a:schemeClr val="tx1">
+                    <a:lumMod val="95000"/>
                   </a:schemeClr>
                 </a:solidFill>
               </a:rPr>
               <a:t>We define the signal (dependent variable) as y(t)  = 1 if today’s close &gt; yesterday’s close or -1 (if less</a:t>
+            </a:r>
+            <a:r>
+              <a:rPr lang="en-US" sz="2000" dirty="0">
+                <a:solidFill>
+                  <a:schemeClr val="tx1">
+                    <a:lumMod val="95000"/>
+                  </a:schemeClr>
+                </a:solidFill>
+              </a:rPr>
+              <a:t>)</a:t>
+            </a:r>
+          </a:p>
+          <a:p>
+            <a:r>
+              <a:rPr lang="en-US" sz="1900" dirty="0">
+                <a:solidFill>
+                  <a:schemeClr val="tx1">
+                    <a:lumMod val="95000"/>
+                  </a:schemeClr>
+                </a:solidFill>
+              </a:rPr>
+              <a:t>Training/Testing data sets have about 3400/850 data points each respectively (75/25 distribution)</a:t>
+            </a:r>
+            <a:r>
+              <a:rPr lang="en-US" sz="2000" dirty="0">
+                <a:solidFill>
+                  <a:schemeClr val="tx1">
+                    <a:lumMod val="95000"/>
+                  </a:schemeClr>
+                </a:solidFill>
+              </a:rPr>
+              <a:t>	</a:t>
             </a:r>
             <a:r>
               <a:rPr lang="en-US" sz="2000" dirty="0">
@@ -13534,29 +13651,7 @@
                   </a:schemeClr>
                 </a:solidFill>
               </a:rPr>
-              <a:t>)</a:t>
-            </a:r>
-          </a:p>
-          <a:p>
-            <a:r>
-              <a:rPr lang="en-US" sz="1900" dirty="0">
-                <a:solidFill>
-                  <a:schemeClr val="accent2">
-                    <a:lumMod val="75000"/>
-                  </a:schemeClr>
-                </a:solidFill>
-              </a:rPr>
-              <a:t>Training/Testing data sets have about 3400/850 data points each respectively (75/25 distribution)</a:t>
-            </a:r>
-            <a:r>
-              <a:rPr lang="en-US" sz="2000" dirty="0">
-                <a:solidFill>
-                  <a:schemeClr val="accent2">
-                    <a:lumMod val="75000"/>
-                  </a:schemeClr>
-                </a:solidFill>
-              </a:rPr>
-              <a:t>			</a:t>
+              <a:t>		</a:t>
             </a:r>
           </a:p>
           <a:p>
@@ -13904,8 +13999,8 @@
             <a:r>
               <a:rPr lang="en-US" sz="1900" dirty="0">
                 <a:solidFill>
-                  <a:schemeClr val="accent2">
-                    <a:lumMod val="75000"/>
+                  <a:schemeClr val="tx1">
+                    <a:lumMod val="95000"/>
                   </a:schemeClr>
                 </a:solidFill>
               </a:rPr>
@@ -13917,8 +14012,8 @@
             <a:r>
               <a:rPr lang="en-US" sz="1500" dirty="0">
                 <a:solidFill>
-                  <a:schemeClr val="accent2">
-                    <a:lumMod val="75000"/>
+                  <a:schemeClr val="tx1">
+                    <a:lumMod val="95000"/>
                   </a:schemeClr>
                 </a:solidFill>
               </a:rPr>
@@ -13930,8 +14025,8 @@
             <a:r>
               <a:rPr lang="en-US" sz="1500" dirty="0">
                 <a:solidFill>
-                  <a:schemeClr val="accent2">
-                    <a:lumMod val="75000"/>
+                  <a:schemeClr val="tx1">
+                    <a:lumMod val="95000"/>
                   </a:schemeClr>
                 </a:solidFill>
               </a:rPr>
@@ -13943,8 +14038,8 @@
             <a:r>
               <a:rPr lang="en-US" sz="1500" dirty="0">
                 <a:solidFill>
-                  <a:schemeClr val="accent2">
-                    <a:lumMod val="75000"/>
+                  <a:schemeClr val="tx1">
+                    <a:lumMod val="95000"/>
                   </a:schemeClr>
                 </a:solidFill>
               </a:rPr>
@@ -14292,8 +14387,8 @@
             <a:r>
               <a:rPr lang="en-US" sz="1600" dirty="0">
                 <a:solidFill>
-                  <a:schemeClr val="accent2">
-                    <a:lumMod val="75000"/>
+                  <a:schemeClr val="tx1">
+                    <a:lumMod val="95000"/>
                   </a:schemeClr>
                 </a:solidFill>
               </a:rPr>
@@ -14340,8 +14435,8 @@
             <a:r>
               <a:rPr lang="en-US" sz="1600" dirty="0">
                 <a:solidFill>
-                  <a:schemeClr val="accent2">
-                    <a:lumMod val="75000"/>
+                  <a:schemeClr val="tx1">
+                    <a:lumMod val="95000"/>
                   </a:schemeClr>
                 </a:solidFill>
               </a:rPr>
@@ -14512,7 +14607,7 @@
                   </a:schemeClr>
                 </a:solidFill>
               </a:rPr>
-              <a:t>• Overall, the total accuracy improves compared to the previous models (65%)</a:t>
+              <a:t>• Overall, the total accuracy improves compared to the previous models (65% Probability)</a:t>
             </a:r>
           </a:p>
           <a:p>
@@ -14590,40 +14685,20 @@
             <a:r>
               <a:rPr lang="en-US" sz="1500" dirty="0">
                 <a:solidFill>
-                  <a:schemeClr val="accent2">
-                    <a:lumMod val="75000"/>
+                  <a:schemeClr val="tx1">
+                    <a:lumMod val="95000"/>
                   </a:schemeClr>
                 </a:solidFill>
               </a:rPr>
-              <a:t>•</a:t>
+              <a:t>• Shorter term indicators used as inputs (shorter Moving Averages, correlation and Intraday data)</a:t>
             </a:r>
+          </a:p>
+          <a:p>
             <a:r>
               <a:rPr lang="en-US" sz="1500" dirty="0">
                 <a:solidFill>
                   <a:schemeClr val="tx1">
                     <a:lumMod val="95000"/>
-                  </a:schemeClr>
-                </a:solidFill>
-              </a:rPr>
-              <a:t> </a:t>
-            </a:r>
-            <a:r>
-              <a:rPr lang="en-US" sz="1500" dirty="0">
-                <a:solidFill>
-                  <a:schemeClr val="accent2">
-                    <a:lumMod val="75000"/>
-                  </a:schemeClr>
-                </a:solidFill>
-              </a:rPr>
-              <a:t>Shorter term indicators used as inputs (shorter Moving Averages, correlation and Intraday data)</a:t>
-            </a:r>
-          </a:p>
-          <a:p>
-            <a:r>
-              <a:rPr lang="en-US" sz="1500" dirty="0">
-                <a:solidFill>
-                  <a:schemeClr val="accent2">
-                    <a:lumMod val="75000"/>
                   </a:schemeClr>
                 </a:solidFill>
               </a:rPr>
@@ -14770,8 +14845,8 @@
             <a:r>
               <a:rPr lang="en-US" sz="1500" dirty="0">
                 <a:solidFill>
-                  <a:schemeClr val="accent2">
-                    <a:lumMod val="75000"/>
+                  <a:schemeClr val="tx1">
+                    <a:lumMod val="95000"/>
                   </a:schemeClr>
                 </a:solidFill>
               </a:rPr>
@@ -14782,8 +14857,8 @@
             <a:r>
               <a:rPr lang="en-US" sz="1500" dirty="0">
                 <a:solidFill>
-                  <a:schemeClr val="accent2">
-                    <a:lumMod val="75000"/>
+                  <a:schemeClr val="tx1">
+                    <a:lumMod val="95000"/>
                   </a:schemeClr>
                 </a:solidFill>
               </a:rPr>
@@ -14794,8 +14869,8 @@
             <a:r>
               <a:rPr lang="en-US" sz="1500" dirty="0">
                 <a:solidFill>
-                  <a:schemeClr val="accent2">
-                    <a:lumMod val="75000"/>
+                  <a:schemeClr val="tx1">
+                    <a:lumMod val="95000"/>
                   </a:schemeClr>
                 </a:solidFill>
               </a:rPr>
@@ -14812,8 +14887,8 @@
             <a:r>
               <a:rPr lang="en-US" sz="1500" dirty="0">
                 <a:solidFill>
-                  <a:schemeClr val="accent2">
-                    <a:lumMod val="75000"/>
+                  <a:schemeClr val="tx1">
+                    <a:lumMod val="95000"/>
                   </a:schemeClr>
                 </a:solidFill>
               </a:rPr>
@@ -14822,56 +14897,26 @@
           </a:p>
           <a:p>
             <a:r>
-              <a:rPr lang="en-US" sz="1500">
+              <a:rPr lang="en-US" sz="1500" dirty="0">
                 <a:solidFill>
-                  <a:schemeClr val="accent2">
-                    <a:lumMod val="75000"/>
+                  <a:schemeClr val="tx1">
+                    <a:lumMod val="95000"/>
                   </a:schemeClr>
                 </a:solidFill>
               </a:rPr>
-              <a:t>Imagination </a:t>
+              <a:t>Imagination is the limit, new data sets could be used and combined to produce alpha </a:t>
             </a:r>
+          </a:p>
+          <a:p>
             <a:r>
               <a:rPr lang="en-US" sz="1500" dirty="0">
                 <a:solidFill>
-                  <a:schemeClr val="accent2">
-                    <a:lumMod val="75000"/>
+                  <a:schemeClr val="tx1">
+                    <a:lumMod val="95000"/>
                   </a:schemeClr>
                 </a:solidFill>
               </a:rPr>
-              <a:t>is the limit, new data sets could be used and combined to produce </a:t>
-            </a:r>
-            <a:r>
-              <a:rPr lang="en-US" sz="1500">
-                <a:solidFill>
-                  <a:schemeClr val="accent2">
-                    <a:lumMod val="75000"/>
-                  </a:schemeClr>
-                </a:solidFill>
-              </a:rPr>
-              <a:t>alpha </a:t>
-            </a:r>
-          </a:p>
-          <a:p>
-            <a:r>
-              <a:rPr lang="en-US" sz="1500">
-                <a:solidFill>
-                  <a:schemeClr val="accent2">
-                    <a:lumMod val="75000"/>
-                  </a:schemeClr>
-                </a:solidFill>
-              </a:rPr>
-              <a:t>Finally</a:t>
-            </a:r>
-            <a:r>
-              <a:rPr lang="en-US" sz="1500" dirty="0">
-                <a:solidFill>
-                  <a:schemeClr val="accent2">
-                    <a:lumMod val="75000"/>
-                  </a:schemeClr>
-                </a:solidFill>
-              </a:rPr>
-              <a:t>, training a Neural Network would be worth testing.</a:t>
+              <a:t>Finally, training a Neural Network would be worth testing.</a:t>
             </a:r>
           </a:p>
           <a:p>

</xml_diff>